<commit_message>
omg the stan model works
</commit_message>
<xml_diff>
--- a/Instructions/Presentation1.pptx
+++ b/Instructions/Presentation1.pptx
@@ -6,6 +6,7 @@
   </p:sldMasterIdLst>
   <p:sldIdLst>
     <p:sldId id="256" r:id="rId2"/>
+    <p:sldId id="257" r:id="rId3"/>
   </p:sldIdLst>
   <p:sldSz cx="12192000" cy="6858000"/>
   <p:notesSz cx="6858000" cy="9144000"/>
@@ -272,7 +273,7 @@
           <a:p>
             <a:fld id="{C8A22DB5-CED2-2945-9986-E695A3EC7810}" type="datetimeFigureOut">
               <a:rPr lang="en-DE" smtClean="0"/>
-              <a:t>27.05.22</a:t>
+              <a:t>1/18/24</a:t>
             </a:fld>
             <a:endParaRPr lang="en-DE"/>
           </a:p>
@@ -472,7 +473,7 @@
           <a:p>
             <a:fld id="{C8A22DB5-CED2-2945-9986-E695A3EC7810}" type="datetimeFigureOut">
               <a:rPr lang="en-DE" smtClean="0"/>
-              <a:t>27.05.22</a:t>
+              <a:t>1/18/24</a:t>
             </a:fld>
             <a:endParaRPr lang="en-DE"/>
           </a:p>
@@ -682,7 +683,7 @@
           <a:p>
             <a:fld id="{C8A22DB5-CED2-2945-9986-E695A3EC7810}" type="datetimeFigureOut">
               <a:rPr lang="en-DE" smtClean="0"/>
-              <a:t>27.05.22</a:t>
+              <a:t>1/18/24</a:t>
             </a:fld>
             <a:endParaRPr lang="en-DE"/>
           </a:p>
@@ -882,7 +883,7 @@
           <a:p>
             <a:fld id="{C8A22DB5-CED2-2945-9986-E695A3EC7810}" type="datetimeFigureOut">
               <a:rPr lang="en-DE" smtClean="0"/>
-              <a:t>27.05.22</a:t>
+              <a:t>1/18/24</a:t>
             </a:fld>
             <a:endParaRPr lang="en-DE"/>
           </a:p>
@@ -1158,7 +1159,7 @@
           <a:p>
             <a:fld id="{C8A22DB5-CED2-2945-9986-E695A3EC7810}" type="datetimeFigureOut">
               <a:rPr lang="en-DE" smtClean="0"/>
-              <a:t>27.05.22</a:t>
+              <a:t>1/18/24</a:t>
             </a:fld>
             <a:endParaRPr lang="en-DE"/>
           </a:p>
@@ -1426,7 +1427,7 @@
           <a:p>
             <a:fld id="{C8A22DB5-CED2-2945-9986-E695A3EC7810}" type="datetimeFigureOut">
               <a:rPr lang="en-DE" smtClean="0"/>
-              <a:t>27.05.22</a:t>
+              <a:t>1/18/24</a:t>
             </a:fld>
             <a:endParaRPr lang="en-DE"/>
           </a:p>
@@ -1841,7 +1842,7 @@
           <a:p>
             <a:fld id="{C8A22DB5-CED2-2945-9986-E695A3EC7810}" type="datetimeFigureOut">
               <a:rPr lang="en-DE" smtClean="0"/>
-              <a:t>27.05.22</a:t>
+              <a:t>1/18/24</a:t>
             </a:fld>
             <a:endParaRPr lang="en-DE"/>
           </a:p>
@@ -1983,7 +1984,7 @@
           <a:p>
             <a:fld id="{C8A22DB5-CED2-2945-9986-E695A3EC7810}" type="datetimeFigureOut">
               <a:rPr lang="en-DE" smtClean="0"/>
-              <a:t>27.05.22</a:t>
+              <a:t>1/18/24</a:t>
             </a:fld>
             <a:endParaRPr lang="en-DE"/>
           </a:p>
@@ -2096,7 +2097,7 @@
           <a:p>
             <a:fld id="{C8A22DB5-CED2-2945-9986-E695A3EC7810}" type="datetimeFigureOut">
               <a:rPr lang="en-DE" smtClean="0"/>
-              <a:t>27.05.22</a:t>
+              <a:t>1/18/24</a:t>
             </a:fld>
             <a:endParaRPr lang="en-DE"/>
           </a:p>
@@ -2409,7 +2410,7 @@
           <a:p>
             <a:fld id="{C8A22DB5-CED2-2945-9986-E695A3EC7810}" type="datetimeFigureOut">
               <a:rPr lang="en-DE" smtClean="0"/>
-              <a:t>27.05.22</a:t>
+              <a:t>1/18/24</a:t>
             </a:fld>
             <a:endParaRPr lang="en-DE"/>
           </a:p>
@@ -2698,7 +2699,7 @@
           <a:p>
             <a:fld id="{C8A22DB5-CED2-2945-9986-E695A3EC7810}" type="datetimeFigureOut">
               <a:rPr lang="en-DE" smtClean="0"/>
-              <a:t>27.05.22</a:t>
+              <a:t>1/18/24</a:t>
             </a:fld>
             <a:endParaRPr lang="en-DE"/>
           </a:p>
@@ -2941,7 +2942,7 @@
           <a:p>
             <a:fld id="{C8A22DB5-CED2-2945-9986-E695A3EC7810}" type="datetimeFigureOut">
               <a:rPr lang="en-DE" smtClean="0"/>
-              <a:t>27.05.22</a:t>
+              <a:t>1/18/24</a:t>
             </a:fld>
             <a:endParaRPr lang="en-DE"/>
           </a:p>
@@ -3421,6 +3422,1712 @@
 </p:sld>
 </file>
 
+<file path=ppt/slides/slide2.xml><?xml version="1.0" encoding="utf-8"?>
+<p:sld xmlns:a="http://schemas.openxmlformats.org/drawingml/2006/main" xmlns:r="http://schemas.openxmlformats.org/officeDocument/2006/relationships" xmlns:p="http://schemas.openxmlformats.org/presentationml/2006/main">
+  <p:cSld>
+    <p:spTree>
+      <p:nvGrpSpPr>
+        <p:cNvPr id="1" name=""/>
+        <p:cNvGrpSpPr/>
+        <p:nvPr/>
+      </p:nvGrpSpPr>
+      <p:grpSpPr>
+        <a:xfrm>
+          <a:off x="0" y="0"/>
+          <a:ext cx="0" cy="0"/>
+          <a:chOff x="0" y="0"/>
+          <a:chExt cx="0" cy="0"/>
+        </a:xfrm>
+      </p:grpSpPr>
+      <p:sp>
+        <p:nvSpPr>
+          <p:cNvPr id="80" name="Rounded Rectangle 79">
+            <a:extLst>
+              <a:ext uri="{FF2B5EF4-FFF2-40B4-BE49-F238E27FC236}">
+                <a16:creationId xmlns:a16="http://schemas.microsoft.com/office/drawing/2014/main" id="{550CA6F4-08DD-E913-55DE-24950772EA15}"/>
+              </a:ext>
+            </a:extLst>
+          </p:cNvPr>
+          <p:cNvSpPr/>
+          <p:nvPr/>
+        </p:nvSpPr>
+        <p:spPr>
+          <a:xfrm>
+            <a:off x="522711" y="1476230"/>
+            <a:ext cx="6574279" cy="5225905"/>
+          </a:xfrm>
+          <a:prstGeom prst="roundRect">
+            <a:avLst/>
+          </a:prstGeom>
+          <a:solidFill>
+            <a:schemeClr val="bg2"/>
+          </a:solidFill>
+        </p:spPr>
+        <p:style>
+          <a:lnRef idx="2">
+            <a:schemeClr val="accent1">
+              <a:shade val="15000"/>
+            </a:schemeClr>
+          </a:lnRef>
+          <a:fillRef idx="1">
+            <a:schemeClr val="accent1"/>
+          </a:fillRef>
+          <a:effectRef idx="0">
+            <a:schemeClr val="accent1"/>
+          </a:effectRef>
+          <a:fontRef idx="minor">
+            <a:schemeClr val="lt1"/>
+          </a:fontRef>
+        </p:style>
+        <p:txBody>
+          <a:bodyPr rtlCol="0" anchor="ctr"/>
+          <a:lstStyle/>
+          <a:p>
+            <a:pPr algn="ctr"/>
+            <a:endParaRPr lang="en-US"/>
+          </a:p>
+        </p:txBody>
+      </p:sp>
+      <p:sp>
+        <p:nvSpPr>
+          <p:cNvPr id="79" name="Rounded Rectangle 78">
+            <a:extLst>
+              <a:ext uri="{FF2B5EF4-FFF2-40B4-BE49-F238E27FC236}">
+                <a16:creationId xmlns:a16="http://schemas.microsoft.com/office/drawing/2014/main" id="{31ABF7B2-CFEE-AC9D-3572-FE38DE407E6C}"/>
+              </a:ext>
+            </a:extLst>
+          </p:cNvPr>
+          <p:cNvSpPr/>
+          <p:nvPr/>
+        </p:nvSpPr>
+        <p:spPr>
+          <a:xfrm>
+            <a:off x="1091046" y="3148446"/>
+            <a:ext cx="5507182" cy="3344430"/>
+          </a:xfrm>
+          <a:prstGeom prst="roundRect">
+            <a:avLst/>
+          </a:prstGeom>
+          <a:solidFill>
+            <a:schemeClr val="bg2"/>
+          </a:solidFill>
+        </p:spPr>
+        <p:style>
+          <a:lnRef idx="2">
+            <a:schemeClr val="accent1">
+              <a:shade val="15000"/>
+            </a:schemeClr>
+          </a:lnRef>
+          <a:fillRef idx="1">
+            <a:schemeClr val="accent1"/>
+          </a:fillRef>
+          <a:effectRef idx="0">
+            <a:schemeClr val="accent1"/>
+          </a:effectRef>
+          <a:fontRef idx="minor">
+            <a:schemeClr val="lt1"/>
+          </a:fontRef>
+        </p:style>
+        <p:txBody>
+          <a:bodyPr rtlCol="0" anchor="ctr"/>
+          <a:lstStyle/>
+          <a:p>
+            <a:pPr algn="ctr"/>
+            <a:endParaRPr lang="en-US"/>
+          </a:p>
+        </p:txBody>
+      </p:sp>
+      <p:sp>
+        <p:nvSpPr>
+          <p:cNvPr id="81" name="Rounded Rectangle 80">
+            <a:extLst>
+              <a:ext uri="{FF2B5EF4-FFF2-40B4-BE49-F238E27FC236}">
+                <a16:creationId xmlns:a16="http://schemas.microsoft.com/office/drawing/2014/main" id="{889A7BF9-4B0A-1631-701D-4D37CB11B899}"/>
+              </a:ext>
+            </a:extLst>
+          </p:cNvPr>
+          <p:cNvSpPr/>
+          <p:nvPr/>
+        </p:nvSpPr>
+        <p:spPr>
+          <a:xfrm>
+            <a:off x="2801481" y="4934219"/>
+            <a:ext cx="2069426" cy="1215747"/>
+          </a:xfrm>
+          <a:prstGeom prst="roundRect">
+            <a:avLst/>
+          </a:prstGeom>
+          <a:solidFill>
+            <a:schemeClr val="bg2"/>
+          </a:solidFill>
+        </p:spPr>
+        <p:style>
+          <a:lnRef idx="2">
+            <a:schemeClr val="accent1">
+              <a:shade val="15000"/>
+            </a:schemeClr>
+          </a:lnRef>
+          <a:fillRef idx="1">
+            <a:schemeClr val="accent1"/>
+          </a:fillRef>
+          <a:effectRef idx="0">
+            <a:schemeClr val="accent1"/>
+          </a:effectRef>
+          <a:fontRef idx="minor">
+            <a:schemeClr val="lt1"/>
+          </a:fontRef>
+        </p:style>
+        <p:txBody>
+          <a:bodyPr rtlCol="0" anchor="ctr"/>
+          <a:lstStyle/>
+          <a:p>
+            <a:pPr algn="ctr"/>
+            <a:endParaRPr lang="en-US"/>
+          </a:p>
+        </p:txBody>
+      </p:sp>
+      <p:sp>
+        <p:nvSpPr>
+          <p:cNvPr id="2" name="Title 1">
+            <a:extLst>
+              <a:ext uri="{FF2B5EF4-FFF2-40B4-BE49-F238E27FC236}">
+                <a16:creationId xmlns:a16="http://schemas.microsoft.com/office/drawing/2014/main" id="{E3BD3ADE-5273-AD51-48F8-B504D6B99E3C}"/>
+              </a:ext>
+            </a:extLst>
+          </p:cNvPr>
+          <p:cNvSpPr>
+            <a:spLocks noGrp="1"/>
+          </p:cNvSpPr>
+          <p:nvPr>
+            <p:ph type="title"/>
+          </p:nvPr>
+        </p:nvSpPr>
+        <p:spPr/>
+        <p:txBody>
+          <a:bodyPr/>
+          <a:lstStyle/>
+          <a:p>
+            <a:r>
+              <a:rPr lang="en-US" dirty="0"/>
+              <a:t>Modelling</a:t>
+            </a:r>
+          </a:p>
+        </p:txBody>
+      </p:sp>
+      <p:sp>
+        <p:nvSpPr>
+          <p:cNvPr id="6" name="Oval 5">
+            <a:extLst>
+              <a:ext uri="{FF2B5EF4-FFF2-40B4-BE49-F238E27FC236}">
+                <a16:creationId xmlns:a16="http://schemas.microsoft.com/office/drawing/2014/main" id="{123FD377-436D-76F6-4E28-5CF598101060}"/>
+              </a:ext>
+            </a:extLst>
+          </p:cNvPr>
+          <p:cNvSpPr/>
+          <p:nvPr/>
+        </p:nvSpPr>
+        <p:spPr>
+          <a:xfrm>
+            <a:off x="1289930" y="3519887"/>
+            <a:ext cx="914400" cy="914400"/>
+          </a:xfrm>
+          <a:prstGeom prst="ellipse">
+            <a:avLst/>
+          </a:prstGeom>
+          <a:solidFill>
+            <a:schemeClr val="bg1">
+              <a:lumMod val="65000"/>
+            </a:schemeClr>
+          </a:solidFill>
+          <a:ln>
+            <a:solidFill>
+              <a:schemeClr val="tx1"/>
+            </a:solidFill>
+          </a:ln>
+        </p:spPr>
+        <p:style>
+          <a:lnRef idx="2">
+            <a:schemeClr val="accent1">
+              <a:shade val="15000"/>
+            </a:schemeClr>
+          </a:lnRef>
+          <a:fillRef idx="1">
+            <a:schemeClr val="accent1"/>
+          </a:fillRef>
+          <a:effectRef idx="0">
+            <a:schemeClr val="accent1"/>
+          </a:effectRef>
+          <a:fontRef idx="minor">
+            <a:schemeClr val="lt1"/>
+          </a:fontRef>
+        </p:style>
+        <p:txBody>
+          <a:bodyPr rtlCol="0" anchor="ctr"/>
+          <a:lstStyle/>
+          <a:p>
+            <a:pPr algn="ctr"/>
+            <a:r>
+              <a:rPr lang="en-US" dirty="0" err="1"/>
+              <a:t>lr</a:t>
+            </a:r>
+            <a:endParaRPr lang="en-US" dirty="0"/>
+          </a:p>
+        </p:txBody>
+      </p:sp>
+      <p:sp>
+        <p:nvSpPr>
+          <p:cNvPr id="7" name="Oval 6">
+            <a:extLst>
+              <a:ext uri="{FF2B5EF4-FFF2-40B4-BE49-F238E27FC236}">
+                <a16:creationId xmlns:a16="http://schemas.microsoft.com/office/drawing/2014/main" id="{298621BD-EFB1-68C0-3AA1-CCAC14FA30B6}"/>
+              </a:ext>
+            </a:extLst>
+          </p:cNvPr>
+          <p:cNvSpPr/>
+          <p:nvPr/>
+        </p:nvSpPr>
+        <p:spPr>
+          <a:xfrm>
+            <a:off x="3355831" y="3530278"/>
+            <a:ext cx="914400" cy="914400"/>
+          </a:xfrm>
+          <a:prstGeom prst="ellipse">
+            <a:avLst/>
+          </a:prstGeom>
+          <a:solidFill>
+            <a:schemeClr val="bg1">
+              <a:lumMod val="65000"/>
+            </a:schemeClr>
+          </a:solidFill>
+          <a:ln>
+            <a:solidFill>
+              <a:schemeClr val="tx1"/>
+            </a:solidFill>
+          </a:ln>
+        </p:spPr>
+        <p:style>
+          <a:lnRef idx="2">
+            <a:schemeClr val="accent1">
+              <a:shade val="15000"/>
+            </a:schemeClr>
+          </a:lnRef>
+          <a:fillRef idx="1">
+            <a:schemeClr val="accent1"/>
+          </a:fillRef>
+          <a:effectRef idx="0">
+            <a:schemeClr val="accent1"/>
+          </a:effectRef>
+          <a:fontRef idx="minor">
+            <a:schemeClr val="lt1"/>
+          </a:fontRef>
+        </p:style>
+        <p:txBody>
+          <a:bodyPr rtlCol="0" anchor="ctr"/>
+          <a:lstStyle/>
+          <a:p>
+            <a:pPr algn="ctr"/>
+            <a:r>
+              <a:rPr lang="en-US" dirty="0" err="1"/>
+              <a:t>sw</a:t>
+            </a:r>
+            <a:endParaRPr lang="en-US" dirty="0"/>
+          </a:p>
+        </p:txBody>
+      </p:sp>
+      <p:sp>
+        <p:nvSpPr>
+          <p:cNvPr id="8" name="Oval 7">
+            <a:extLst>
+              <a:ext uri="{FF2B5EF4-FFF2-40B4-BE49-F238E27FC236}">
+                <a16:creationId xmlns:a16="http://schemas.microsoft.com/office/drawing/2014/main" id="{0152F1AD-BF92-CF0D-E88B-435FCE0409E6}"/>
+              </a:ext>
+            </a:extLst>
+          </p:cNvPr>
+          <p:cNvSpPr/>
+          <p:nvPr/>
+        </p:nvSpPr>
+        <p:spPr>
+          <a:xfrm>
+            <a:off x="5336068" y="3530278"/>
+            <a:ext cx="914400" cy="914400"/>
+          </a:xfrm>
+          <a:prstGeom prst="ellipse">
+            <a:avLst/>
+          </a:prstGeom>
+          <a:solidFill>
+            <a:schemeClr val="bg1">
+              <a:lumMod val="65000"/>
+            </a:schemeClr>
+          </a:solidFill>
+          <a:ln>
+            <a:solidFill>
+              <a:schemeClr val="tx1"/>
+            </a:solidFill>
+          </a:ln>
+        </p:spPr>
+        <p:style>
+          <a:lnRef idx="2">
+            <a:schemeClr val="accent1">
+              <a:shade val="15000"/>
+            </a:schemeClr>
+          </a:lnRef>
+          <a:fillRef idx="1">
+            <a:schemeClr val="accent1"/>
+          </a:fillRef>
+          <a:effectRef idx="0">
+            <a:schemeClr val="accent1"/>
+          </a:effectRef>
+          <a:fontRef idx="minor">
+            <a:schemeClr val="lt1"/>
+          </a:fontRef>
+        </p:style>
+        <p:txBody>
+          <a:bodyPr rtlCol="0" anchor="ctr"/>
+          <a:lstStyle/>
+          <a:p>
+            <a:pPr algn="ctr"/>
+            <a:r>
+              <a:rPr lang="en-US" dirty="0"/>
+              <a:t>tau</a:t>
+            </a:r>
+          </a:p>
+        </p:txBody>
+      </p:sp>
+      <p:sp>
+        <p:nvSpPr>
+          <p:cNvPr id="9" name="Oval 8">
+            <a:extLst>
+              <a:ext uri="{FF2B5EF4-FFF2-40B4-BE49-F238E27FC236}">
+                <a16:creationId xmlns:a16="http://schemas.microsoft.com/office/drawing/2014/main" id="{7FF80516-AB04-3285-BF19-79C183D4D766}"/>
+              </a:ext>
+            </a:extLst>
+          </p:cNvPr>
+          <p:cNvSpPr/>
+          <p:nvPr/>
+        </p:nvSpPr>
+        <p:spPr>
+          <a:xfrm>
+            <a:off x="884110" y="1719892"/>
+            <a:ext cx="914400" cy="914400"/>
+          </a:xfrm>
+          <a:prstGeom prst="ellipse">
+            <a:avLst/>
+          </a:prstGeom>
+          <a:solidFill>
+            <a:schemeClr val="bg1">
+              <a:lumMod val="65000"/>
+            </a:schemeClr>
+          </a:solidFill>
+          <a:ln>
+            <a:solidFill>
+              <a:schemeClr val="tx1"/>
+            </a:solidFill>
+          </a:ln>
+        </p:spPr>
+        <p:style>
+          <a:lnRef idx="2">
+            <a:schemeClr val="accent1">
+              <a:shade val="15000"/>
+            </a:schemeClr>
+          </a:lnRef>
+          <a:fillRef idx="1">
+            <a:schemeClr val="accent1"/>
+          </a:fillRef>
+          <a:effectRef idx="0">
+            <a:schemeClr val="accent1"/>
+          </a:effectRef>
+          <a:fontRef idx="minor">
+            <a:schemeClr val="lt1"/>
+          </a:fontRef>
+        </p:style>
+        <p:txBody>
+          <a:bodyPr rtlCol="0" anchor="ctr"/>
+          <a:lstStyle/>
+          <a:p>
+            <a:pPr algn="ctr"/>
+            <a:r>
+              <a:rPr lang="en-US" dirty="0"/>
+              <a:t>mu</a:t>
+            </a:r>
+          </a:p>
+        </p:txBody>
+      </p:sp>
+      <p:sp>
+        <p:nvSpPr>
+          <p:cNvPr id="10" name="Oval 9">
+            <a:extLst>
+              <a:ext uri="{FF2B5EF4-FFF2-40B4-BE49-F238E27FC236}">
+                <a16:creationId xmlns:a16="http://schemas.microsoft.com/office/drawing/2014/main" id="{D4E91699-A708-A3F8-1C19-E14D2F56F566}"/>
+              </a:ext>
+            </a:extLst>
+          </p:cNvPr>
+          <p:cNvSpPr/>
+          <p:nvPr/>
+        </p:nvSpPr>
+        <p:spPr>
+          <a:xfrm>
+            <a:off x="2889075" y="1730415"/>
+            <a:ext cx="914400" cy="914400"/>
+          </a:xfrm>
+          <a:prstGeom prst="ellipse">
+            <a:avLst/>
+          </a:prstGeom>
+          <a:solidFill>
+            <a:schemeClr val="bg1">
+              <a:lumMod val="65000"/>
+            </a:schemeClr>
+          </a:solidFill>
+          <a:ln>
+            <a:solidFill>
+              <a:schemeClr val="tx1"/>
+            </a:solidFill>
+          </a:ln>
+        </p:spPr>
+        <p:style>
+          <a:lnRef idx="2">
+            <a:schemeClr val="accent1">
+              <a:shade val="15000"/>
+            </a:schemeClr>
+          </a:lnRef>
+          <a:fillRef idx="1">
+            <a:schemeClr val="accent1"/>
+          </a:fillRef>
+          <a:effectRef idx="0">
+            <a:schemeClr val="accent1"/>
+          </a:effectRef>
+          <a:fontRef idx="minor">
+            <a:schemeClr val="lt1"/>
+          </a:fontRef>
+        </p:style>
+        <p:txBody>
+          <a:bodyPr rtlCol="0" anchor="ctr"/>
+          <a:lstStyle/>
+          <a:p>
+            <a:pPr algn="ctr"/>
+            <a:r>
+              <a:rPr lang="en-US" dirty="0"/>
+              <a:t>mu</a:t>
+            </a:r>
+          </a:p>
+        </p:txBody>
+      </p:sp>
+      <p:sp>
+        <p:nvSpPr>
+          <p:cNvPr id="11" name="Oval 10">
+            <a:extLst>
+              <a:ext uri="{FF2B5EF4-FFF2-40B4-BE49-F238E27FC236}">
+                <a16:creationId xmlns:a16="http://schemas.microsoft.com/office/drawing/2014/main" id="{17C9AFB4-7DB7-E6C5-2B8B-71B022D7013A}"/>
+              </a:ext>
+            </a:extLst>
+          </p:cNvPr>
+          <p:cNvSpPr/>
+          <p:nvPr/>
+        </p:nvSpPr>
+        <p:spPr>
+          <a:xfrm>
+            <a:off x="5809321" y="1746787"/>
+            <a:ext cx="914400" cy="914400"/>
+          </a:xfrm>
+          <a:prstGeom prst="ellipse">
+            <a:avLst/>
+          </a:prstGeom>
+          <a:solidFill>
+            <a:schemeClr val="bg1">
+              <a:lumMod val="65000"/>
+            </a:schemeClr>
+          </a:solidFill>
+          <a:ln>
+            <a:solidFill>
+              <a:schemeClr val="tx1"/>
+            </a:solidFill>
+          </a:ln>
+        </p:spPr>
+        <p:style>
+          <a:lnRef idx="2">
+            <a:schemeClr val="accent1">
+              <a:shade val="15000"/>
+            </a:schemeClr>
+          </a:lnRef>
+          <a:fillRef idx="1">
+            <a:schemeClr val="accent1"/>
+          </a:fillRef>
+          <a:effectRef idx="0">
+            <a:schemeClr val="accent1"/>
+          </a:effectRef>
+          <a:fontRef idx="minor">
+            <a:schemeClr val="lt1"/>
+          </a:fontRef>
+        </p:style>
+        <p:txBody>
+          <a:bodyPr rtlCol="0" anchor="ctr"/>
+          <a:lstStyle/>
+          <a:p>
+            <a:pPr algn="ctr"/>
+            <a:r>
+              <a:rPr lang="en-US" dirty="0"/>
+              <a:t>mu</a:t>
+            </a:r>
+          </a:p>
+        </p:txBody>
+      </p:sp>
+      <p:sp>
+        <p:nvSpPr>
+          <p:cNvPr id="12" name="Oval 11">
+            <a:extLst>
+              <a:ext uri="{FF2B5EF4-FFF2-40B4-BE49-F238E27FC236}">
+                <a16:creationId xmlns:a16="http://schemas.microsoft.com/office/drawing/2014/main" id="{E59C9562-415A-CD1E-0CBE-3E915A453DC5}"/>
+              </a:ext>
+            </a:extLst>
+          </p:cNvPr>
+          <p:cNvSpPr/>
+          <p:nvPr/>
+        </p:nvSpPr>
+        <p:spPr>
+          <a:xfrm>
+            <a:off x="1887081" y="1721076"/>
+            <a:ext cx="914400" cy="914400"/>
+          </a:xfrm>
+          <a:prstGeom prst="ellipse">
+            <a:avLst/>
+          </a:prstGeom>
+          <a:solidFill>
+            <a:schemeClr val="bg1">
+              <a:lumMod val="65000"/>
+            </a:schemeClr>
+          </a:solidFill>
+          <a:ln>
+            <a:solidFill>
+              <a:schemeClr val="tx1"/>
+            </a:solidFill>
+          </a:ln>
+        </p:spPr>
+        <p:style>
+          <a:lnRef idx="2">
+            <a:schemeClr val="accent1">
+              <a:shade val="15000"/>
+            </a:schemeClr>
+          </a:lnRef>
+          <a:fillRef idx="1">
+            <a:schemeClr val="accent1"/>
+          </a:fillRef>
+          <a:effectRef idx="0">
+            <a:schemeClr val="accent1"/>
+          </a:effectRef>
+          <a:fontRef idx="minor">
+            <a:schemeClr val="lt1"/>
+          </a:fontRef>
+        </p:style>
+        <p:txBody>
+          <a:bodyPr rtlCol="0" anchor="ctr"/>
+          <a:lstStyle/>
+          <a:p>
+            <a:pPr algn="ctr"/>
+            <a:r>
+              <a:rPr lang="en-US" dirty="0"/>
+              <a:t>sig</a:t>
+            </a:r>
+          </a:p>
+        </p:txBody>
+      </p:sp>
+      <p:sp>
+        <p:nvSpPr>
+          <p:cNvPr id="13" name="Oval 12">
+            <a:extLst>
+              <a:ext uri="{FF2B5EF4-FFF2-40B4-BE49-F238E27FC236}">
+                <a16:creationId xmlns:a16="http://schemas.microsoft.com/office/drawing/2014/main" id="{BAD2ADFC-186D-E7B3-C916-A9B45F0E8C5F}"/>
+              </a:ext>
+            </a:extLst>
+          </p:cNvPr>
+          <p:cNvSpPr/>
+          <p:nvPr/>
+        </p:nvSpPr>
+        <p:spPr>
+          <a:xfrm>
+            <a:off x="3838976" y="1746787"/>
+            <a:ext cx="914400" cy="914400"/>
+          </a:xfrm>
+          <a:prstGeom prst="ellipse">
+            <a:avLst/>
+          </a:prstGeom>
+          <a:solidFill>
+            <a:schemeClr val="bg1">
+              <a:lumMod val="65000"/>
+            </a:schemeClr>
+          </a:solidFill>
+          <a:ln>
+            <a:solidFill>
+              <a:schemeClr val="tx1"/>
+            </a:solidFill>
+          </a:ln>
+        </p:spPr>
+        <p:style>
+          <a:lnRef idx="2">
+            <a:schemeClr val="accent1">
+              <a:shade val="15000"/>
+            </a:schemeClr>
+          </a:lnRef>
+          <a:fillRef idx="1">
+            <a:schemeClr val="accent1"/>
+          </a:fillRef>
+          <a:effectRef idx="0">
+            <a:schemeClr val="accent1"/>
+          </a:effectRef>
+          <a:fontRef idx="minor">
+            <a:schemeClr val="lt1"/>
+          </a:fontRef>
+        </p:style>
+        <p:txBody>
+          <a:bodyPr rtlCol="0" anchor="ctr"/>
+          <a:lstStyle/>
+          <a:p>
+            <a:pPr algn="ctr"/>
+            <a:r>
+              <a:rPr lang="en-US" dirty="0"/>
+              <a:t>sig</a:t>
+            </a:r>
+          </a:p>
+        </p:txBody>
+      </p:sp>
+      <p:sp>
+        <p:nvSpPr>
+          <p:cNvPr id="14" name="Oval 13">
+            <a:extLst>
+              <a:ext uri="{FF2B5EF4-FFF2-40B4-BE49-F238E27FC236}">
+                <a16:creationId xmlns:a16="http://schemas.microsoft.com/office/drawing/2014/main" id="{32278733-87D8-64D6-2A36-E430FDC65CDD}"/>
+              </a:ext>
+            </a:extLst>
+          </p:cNvPr>
+          <p:cNvSpPr/>
+          <p:nvPr/>
+        </p:nvSpPr>
+        <p:spPr>
+          <a:xfrm>
+            <a:off x="4870906" y="1746787"/>
+            <a:ext cx="914400" cy="914400"/>
+          </a:xfrm>
+          <a:prstGeom prst="ellipse">
+            <a:avLst/>
+          </a:prstGeom>
+          <a:solidFill>
+            <a:schemeClr val="bg1">
+              <a:lumMod val="65000"/>
+            </a:schemeClr>
+          </a:solidFill>
+          <a:ln>
+            <a:solidFill>
+              <a:schemeClr val="tx1"/>
+            </a:solidFill>
+          </a:ln>
+        </p:spPr>
+        <p:style>
+          <a:lnRef idx="2">
+            <a:schemeClr val="accent1">
+              <a:shade val="15000"/>
+            </a:schemeClr>
+          </a:lnRef>
+          <a:fillRef idx="1">
+            <a:schemeClr val="accent1"/>
+          </a:fillRef>
+          <a:effectRef idx="0">
+            <a:schemeClr val="accent1"/>
+          </a:effectRef>
+          <a:fontRef idx="minor">
+            <a:schemeClr val="lt1"/>
+          </a:fontRef>
+        </p:style>
+        <p:txBody>
+          <a:bodyPr rtlCol="0" anchor="ctr"/>
+          <a:lstStyle/>
+          <a:p>
+            <a:pPr algn="ctr"/>
+            <a:r>
+              <a:rPr lang="en-US" dirty="0"/>
+              <a:t>sig</a:t>
+            </a:r>
+          </a:p>
+        </p:txBody>
+      </p:sp>
+      <p:sp>
+        <p:nvSpPr>
+          <p:cNvPr id="15" name="Rectangle 14">
+            <a:extLst>
+              <a:ext uri="{FF2B5EF4-FFF2-40B4-BE49-F238E27FC236}">
+                <a16:creationId xmlns:a16="http://schemas.microsoft.com/office/drawing/2014/main" id="{E4C11F95-1AED-1519-EAA8-BD1791F02A07}"/>
+              </a:ext>
+            </a:extLst>
+          </p:cNvPr>
+          <p:cNvSpPr/>
+          <p:nvPr/>
+        </p:nvSpPr>
+        <p:spPr>
+          <a:xfrm>
+            <a:off x="3381776" y="5087991"/>
+            <a:ext cx="914400" cy="914400"/>
+          </a:xfrm>
+          <a:prstGeom prst="rect">
+            <a:avLst/>
+          </a:prstGeom>
+          <a:solidFill>
+            <a:schemeClr val="bg1">
+              <a:lumMod val="65000"/>
+            </a:schemeClr>
+          </a:solidFill>
+          <a:ln>
+            <a:solidFill>
+              <a:schemeClr val="tx1"/>
+            </a:solidFill>
+          </a:ln>
+        </p:spPr>
+        <p:style>
+          <a:lnRef idx="2">
+            <a:schemeClr val="accent1">
+              <a:shade val="15000"/>
+            </a:schemeClr>
+          </a:lnRef>
+          <a:fillRef idx="1">
+            <a:schemeClr val="accent1"/>
+          </a:fillRef>
+          <a:effectRef idx="0">
+            <a:schemeClr val="accent1"/>
+          </a:effectRef>
+          <a:fontRef idx="minor">
+            <a:schemeClr val="lt1"/>
+          </a:fontRef>
+        </p:style>
+        <p:txBody>
+          <a:bodyPr rtlCol="0" anchor="ctr"/>
+          <a:lstStyle/>
+          <a:p>
+            <a:pPr algn="ctr"/>
+            <a:r>
+              <a:rPr lang="en-US" dirty="0"/>
+              <a:t>choice</a:t>
+            </a:r>
+          </a:p>
+        </p:txBody>
+      </p:sp>
+      <p:cxnSp>
+        <p:nvCxnSpPr>
+          <p:cNvPr id="17" name="Straight Connector 16">
+            <a:extLst>
+              <a:ext uri="{FF2B5EF4-FFF2-40B4-BE49-F238E27FC236}">
+                <a16:creationId xmlns:a16="http://schemas.microsoft.com/office/drawing/2014/main" id="{70AA3577-B1AF-A757-5DF7-5AC19513EFAE}"/>
+              </a:ext>
+            </a:extLst>
+          </p:cNvPr>
+          <p:cNvCxnSpPr>
+            <a:cxnSpLocks/>
+            <a:stCxn id="9" idx="4"/>
+            <a:endCxn id="6" idx="0"/>
+          </p:cNvCxnSpPr>
+          <p:nvPr/>
+        </p:nvCxnSpPr>
+        <p:spPr>
+          <a:xfrm>
+            <a:off x="1341310" y="2634292"/>
+            <a:ext cx="405820" cy="885595"/>
+          </a:xfrm>
+          <a:prstGeom prst="line">
+            <a:avLst/>
+          </a:prstGeom>
+          <a:ln>
+            <a:solidFill>
+              <a:schemeClr val="tx1"/>
+            </a:solidFill>
+          </a:ln>
+        </p:spPr>
+        <p:style>
+          <a:lnRef idx="1">
+            <a:schemeClr val="accent1"/>
+          </a:lnRef>
+          <a:fillRef idx="0">
+            <a:schemeClr val="accent1"/>
+          </a:fillRef>
+          <a:effectRef idx="0">
+            <a:schemeClr val="accent1"/>
+          </a:effectRef>
+          <a:fontRef idx="minor">
+            <a:schemeClr val="tx1"/>
+          </a:fontRef>
+        </p:style>
+      </p:cxnSp>
+      <p:cxnSp>
+        <p:nvCxnSpPr>
+          <p:cNvPr id="19" name="Straight Connector 18">
+            <a:extLst>
+              <a:ext uri="{FF2B5EF4-FFF2-40B4-BE49-F238E27FC236}">
+                <a16:creationId xmlns:a16="http://schemas.microsoft.com/office/drawing/2014/main" id="{69339053-EC3B-8D80-E270-E743D58CB92A}"/>
+              </a:ext>
+            </a:extLst>
+          </p:cNvPr>
+          <p:cNvCxnSpPr>
+            <a:cxnSpLocks/>
+            <a:stCxn id="10" idx="4"/>
+            <a:endCxn id="7" idx="0"/>
+          </p:cNvCxnSpPr>
+          <p:nvPr/>
+        </p:nvCxnSpPr>
+        <p:spPr>
+          <a:xfrm>
+            <a:off x="3346275" y="2644815"/>
+            <a:ext cx="466756" cy="885463"/>
+          </a:xfrm>
+          <a:prstGeom prst="line">
+            <a:avLst/>
+          </a:prstGeom>
+          <a:ln>
+            <a:solidFill>
+              <a:schemeClr val="tx1"/>
+            </a:solidFill>
+          </a:ln>
+        </p:spPr>
+        <p:style>
+          <a:lnRef idx="1">
+            <a:schemeClr val="accent1"/>
+          </a:lnRef>
+          <a:fillRef idx="0">
+            <a:schemeClr val="accent1"/>
+          </a:fillRef>
+          <a:effectRef idx="0">
+            <a:schemeClr val="accent1"/>
+          </a:effectRef>
+          <a:fontRef idx="minor">
+            <a:schemeClr val="tx1"/>
+          </a:fontRef>
+        </p:style>
+      </p:cxnSp>
+      <p:cxnSp>
+        <p:nvCxnSpPr>
+          <p:cNvPr id="22" name="Straight Connector 21">
+            <a:extLst>
+              <a:ext uri="{FF2B5EF4-FFF2-40B4-BE49-F238E27FC236}">
+                <a16:creationId xmlns:a16="http://schemas.microsoft.com/office/drawing/2014/main" id="{F23373E7-6E8F-094D-9AB3-701DB173A0BD}"/>
+              </a:ext>
+            </a:extLst>
+          </p:cNvPr>
+          <p:cNvCxnSpPr>
+            <a:cxnSpLocks/>
+            <a:stCxn id="11" idx="4"/>
+            <a:endCxn id="8" idx="0"/>
+          </p:cNvCxnSpPr>
+          <p:nvPr/>
+        </p:nvCxnSpPr>
+        <p:spPr>
+          <a:xfrm flipH="1">
+            <a:off x="5793268" y="2661187"/>
+            <a:ext cx="473253" cy="869091"/>
+          </a:xfrm>
+          <a:prstGeom prst="line">
+            <a:avLst/>
+          </a:prstGeom>
+          <a:ln>
+            <a:solidFill>
+              <a:schemeClr val="tx1"/>
+            </a:solidFill>
+          </a:ln>
+        </p:spPr>
+        <p:style>
+          <a:lnRef idx="1">
+            <a:schemeClr val="accent1"/>
+          </a:lnRef>
+          <a:fillRef idx="0">
+            <a:schemeClr val="accent1"/>
+          </a:fillRef>
+          <a:effectRef idx="0">
+            <a:schemeClr val="accent1"/>
+          </a:effectRef>
+          <a:fontRef idx="minor">
+            <a:schemeClr val="tx1"/>
+          </a:fontRef>
+        </p:style>
+      </p:cxnSp>
+      <p:cxnSp>
+        <p:nvCxnSpPr>
+          <p:cNvPr id="30" name="Straight Connector 29">
+            <a:extLst>
+              <a:ext uri="{FF2B5EF4-FFF2-40B4-BE49-F238E27FC236}">
+                <a16:creationId xmlns:a16="http://schemas.microsoft.com/office/drawing/2014/main" id="{831C6885-D60D-8E71-FB86-145BC3C92A67}"/>
+              </a:ext>
+            </a:extLst>
+          </p:cNvPr>
+          <p:cNvCxnSpPr>
+            <a:cxnSpLocks/>
+            <a:stCxn id="12" idx="4"/>
+            <a:endCxn id="6" idx="0"/>
+          </p:cNvCxnSpPr>
+          <p:nvPr/>
+        </p:nvCxnSpPr>
+        <p:spPr>
+          <a:xfrm flipH="1">
+            <a:off x="1747130" y="2635476"/>
+            <a:ext cx="597151" cy="884411"/>
+          </a:xfrm>
+          <a:prstGeom prst="line">
+            <a:avLst/>
+          </a:prstGeom>
+          <a:ln>
+            <a:solidFill>
+              <a:schemeClr val="tx1"/>
+            </a:solidFill>
+          </a:ln>
+        </p:spPr>
+        <p:style>
+          <a:lnRef idx="1">
+            <a:schemeClr val="accent1"/>
+          </a:lnRef>
+          <a:fillRef idx="0">
+            <a:schemeClr val="accent1"/>
+          </a:fillRef>
+          <a:effectRef idx="0">
+            <a:schemeClr val="accent1"/>
+          </a:effectRef>
+          <a:fontRef idx="minor">
+            <a:schemeClr val="tx1"/>
+          </a:fontRef>
+        </p:style>
+      </p:cxnSp>
+      <p:cxnSp>
+        <p:nvCxnSpPr>
+          <p:cNvPr id="37" name="Straight Connector 36">
+            <a:extLst>
+              <a:ext uri="{FF2B5EF4-FFF2-40B4-BE49-F238E27FC236}">
+                <a16:creationId xmlns:a16="http://schemas.microsoft.com/office/drawing/2014/main" id="{5EF74D41-4272-7AAC-1D1D-FE4A9E159E68}"/>
+              </a:ext>
+            </a:extLst>
+          </p:cNvPr>
+          <p:cNvCxnSpPr>
+            <a:cxnSpLocks/>
+            <a:stCxn id="13" idx="4"/>
+            <a:endCxn id="7" idx="0"/>
+          </p:cNvCxnSpPr>
+          <p:nvPr/>
+        </p:nvCxnSpPr>
+        <p:spPr>
+          <a:xfrm flipH="1">
+            <a:off x="3813031" y="2661187"/>
+            <a:ext cx="483145" cy="869091"/>
+          </a:xfrm>
+          <a:prstGeom prst="line">
+            <a:avLst/>
+          </a:prstGeom>
+          <a:ln>
+            <a:solidFill>
+              <a:schemeClr val="tx1"/>
+            </a:solidFill>
+          </a:ln>
+        </p:spPr>
+        <p:style>
+          <a:lnRef idx="1">
+            <a:schemeClr val="accent1"/>
+          </a:lnRef>
+          <a:fillRef idx="0">
+            <a:schemeClr val="accent1"/>
+          </a:fillRef>
+          <a:effectRef idx="0">
+            <a:schemeClr val="accent1"/>
+          </a:effectRef>
+          <a:fontRef idx="minor">
+            <a:schemeClr val="tx1"/>
+          </a:fontRef>
+        </p:style>
+      </p:cxnSp>
+      <p:cxnSp>
+        <p:nvCxnSpPr>
+          <p:cNvPr id="44" name="Straight Connector 43">
+            <a:extLst>
+              <a:ext uri="{FF2B5EF4-FFF2-40B4-BE49-F238E27FC236}">
+                <a16:creationId xmlns:a16="http://schemas.microsoft.com/office/drawing/2014/main" id="{06688C46-836B-21E5-571A-A6DC03ABCCAE}"/>
+              </a:ext>
+            </a:extLst>
+          </p:cNvPr>
+          <p:cNvCxnSpPr>
+            <a:cxnSpLocks/>
+            <a:stCxn id="14" idx="4"/>
+            <a:endCxn id="8" idx="0"/>
+          </p:cNvCxnSpPr>
+          <p:nvPr/>
+        </p:nvCxnSpPr>
+        <p:spPr>
+          <a:xfrm>
+            <a:off x="5328106" y="2661187"/>
+            <a:ext cx="465162" cy="869091"/>
+          </a:xfrm>
+          <a:prstGeom prst="line">
+            <a:avLst/>
+          </a:prstGeom>
+          <a:ln>
+            <a:solidFill>
+              <a:schemeClr val="tx1"/>
+            </a:solidFill>
+          </a:ln>
+        </p:spPr>
+        <p:style>
+          <a:lnRef idx="1">
+            <a:schemeClr val="accent1"/>
+          </a:lnRef>
+          <a:fillRef idx="0">
+            <a:schemeClr val="accent1"/>
+          </a:fillRef>
+          <a:effectRef idx="0">
+            <a:schemeClr val="accent1"/>
+          </a:effectRef>
+          <a:fontRef idx="minor">
+            <a:schemeClr val="tx1"/>
+          </a:fontRef>
+        </p:style>
+      </p:cxnSp>
+      <p:cxnSp>
+        <p:nvCxnSpPr>
+          <p:cNvPr id="55" name="Straight Connector 54">
+            <a:extLst>
+              <a:ext uri="{FF2B5EF4-FFF2-40B4-BE49-F238E27FC236}">
+                <a16:creationId xmlns:a16="http://schemas.microsoft.com/office/drawing/2014/main" id="{8E6BDC2C-65BD-36A4-1FA2-C591F53EC8C5}"/>
+              </a:ext>
+            </a:extLst>
+          </p:cNvPr>
+          <p:cNvCxnSpPr>
+            <a:cxnSpLocks/>
+            <a:stCxn id="6" idx="4"/>
+            <a:endCxn id="15" idx="0"/>
+          </p:cNvCxnSpPr>
+          <p:nvPr/>
+        </p:nvCxnSpPr>
+        <p:spPr>
+          <a:xfrm>
+            <a:off x="1747130" y="4434287"/>
+            <a:ext cx="2091846" cy="653704"/>
+          </a:xfrm>
+          <a:prstGeom prst="line">
+            <a:avLst/>
+          </a:prstGeom>
+          <a:ln>
+            <a:solidFill>
+              <a:schemeClr val="tx1"/>
+            </a:solidFill>
+          </a:ln>
+        </p:spPr>
+        <p:style>
+          <a:lnRef idx="1">
+            <a:schemeClr val="accent1"/>
+          </a:lnRef>
+          <a:fillRef idx="0">
+            <a:schemeClr val="accent1"/>
+          </a:fillRef>
+          <a:effectRef idx="0">
+            <a:schemeClr val="accent1"/>
+          </a:effectRef>
+          <a:fontRef idx="minor">
+            <a:schemeClr val="tx1"/>
+          </a:fontRef>
+        </p:style>
+      </p:cxnSp>
+      <p:cxnSp>
+        <p:nvCxnSpPr>
+          <p:cNvPr id="57" name="Straight Connector 56">
+            <a:extLst>
+              <a:ext uri="{FF2B5EF4-FFF2-40B4-BE49-F238E27FC236}">
+                <a16:creationId xmlns:a16="http://schemas.microsoft.com/office/drawing/2014/main" id="{C1D2A2B6-9C94-EB45-7329-96750D99EFB0}"/>
+              </a:ext>
+            </a:extLst>
+          </p:cNvPr>
+          <p:cNvCxnSpPr>
+            <a:cxnSpLocks/>
+            <a:stCxn id="7" idx="4"/>
+            <a:endCxn id="15" idx="0"/>
+          </p:cNvCxnSpPr>
+          <p:nvPr/>
+        </p:nvCxnSpPr>
+        <p:spPr>
+          <a:xfrm>
+            <a:off x="3813031" y="4444678"/>
+            <a:ext cx="25945" cy="643313"/>
+          </a:xfrm>
+          <a:prstGeom prst="line">
+            <a:avLst/>
+          </a:prstGeom>
+          <a:ln>
+            <a:solidFill>
+              <a:schemeClr val="tx1"/>
+            </a:solidFill>
+          </a:ln>
+        </p:spPr>
+        <p:style>
+          <a:lnRef idx="1">
+            <a:schemeClr val="accent1"/>
+          </a:lnRef>
+          <a:fillRef idx="0">
+            <a:schemeClr val="accent1"/>
+          </a:fillRef>
+          <a:effectRef idx="0">
+            <a:schemeClr val="accent1"/>
+          </a:effectRef>
+          <a:fontRef idx="minor">
+            <a:schemeClr val="tx1"/>
+          </a:fontRef>
+        </p:style>
+      </p:cxnSp>
+      <p:cxnSp>
+        <p:nvCxnSpPr>
+          <p:cNvPr id="60" name="Straight Connector 59">
+            <a:extLst>
+              <a:ext uri="{FF2B5EF4-FFF2-40B4-BE49-F238E27FC236}">
+                <a16:creationId xmlns:a16="http://schemas.microsoft.com/office/drawing/2014/main" id="{9BE2F411-4A3E-248D-8D9C-15F96EA9D2C6}"/>
+              </a:ext>
+            </a:extLst>
+          </p:cNvPr>
+          <p:cNvCxnSpPr>
+            <a:cxnSpLocks/>
+            <a:stCxn id="8" idx="4"/>
+            <a:endCxn id="15" idx="0"/>
+          </p:cNvCxnSpPr>
+          <p:nvPr/>
+        </p:nvCxnSpPr>
+        <p:spPr>
+          <a:xfrm flipH="1">
+            <a:off x="3838976" y="4444678"/>
+            <a:ext cx="1954292" cy="643313"/>
+          </a:xfrm>
+          <a:prstGeom prst="line">
+            <a:avLst/>
+          </a:prstGeom>
+          <a:ln>
+            <a:solidFill>
+              <a:schemeClr val="tx1"/>
+            </a:solidFill>
+          </a:ln>
+        </p:spPr>
+        <p:style>
+          <a:lnRef idx="1">
+            <a:schemeClr val="accent1"/>
+          </a:lnRef>
+          <a:fillRef idx="0">
+            <a:schemeClr val="accent1"/>
+          </a:fillRef>
+          <a:effectRef idx="0">
+            <a:schemeClr val="accent1"/>
+          </a:effectRef>
+          <a:fontRef idx="minor">
+            <a:schemeClr val="tx1"/>
+          </a:fontRef>
+        </p:style>
+      </p:cxnSp>
+      <p:cxnSp>
+        <p:nvCxnSpPr>
+          <p:cNvPr id="64" name="Straight Arrow Connector 63">
+            <a:extLst>
+              <a:ext uri="{FF2B5EF4-FFF2-40B4-BE49-F238E27FC236}">
+                <a16:creationId xmlns:a16="http://schemas.microsoft.com/office/drawing/2014/main" id="{6F93662B-A1DF-4FE4-DD49-68E218C505D2}"/>
+              </a:ext>
+            </a:extLst>
+          </p:cNvPr>
+          <p:cNvCxnSpPr>
+            <a:cxnSpLocks/>
+            <a:stCxn id="7" idx="6"/>
+            <a:endCxn id="8" idx="2"/>
+          </p:cNvCxnSpPr>
+          <p:nvPr/>
+        </p:nvCxnSpPr>
+        <p:spPr>
+          <a:xfrm>
+            <a:off x="4270231" y="3987478"/>
+            <a:ext cx="1065837" cy="0"/>
+          </a:xfrm>
+          <a:prstGeom prst="straightConnector1">
+            <a:avLst/>
+          </a:prstGeom>
+          <a:ln>
+            <a:solidFill>
+              <a:schemeClr val="tx1"/>
+            </a:solidFill>
+            <a:headEnd type="triangle"/>
+            <a:tailEnd type="triangle"/>
+          </a:ln>
+        </p:spPr>
+        <p:style>
+          <a:lnRef idx="1">
+            <a:schemeClr val="accent1"/>
+          </a:lnRef>
+          <a:fillRef idx="0">
+            <a:schemeClr val="accent1"/>
+          </a:fillRef>
+          <a:effectRef idx="0">
+            <a:schemeClr val="accent1"/>
+          </a:effectRef>
+          <a:fontRef idx="minor">
+            <a:schemeClr val="tx1"/>
+          </a:fontRef>
+        </p:style>
+      </p:cxnSp>
+      <p:cxnSp>
+        <p:nvCxnSpPr>
+          <p:cNvPr id="66" name="Straight Arrow Connector 65">
+            <a:extLst>
+              <a:ext uri="{FF2B5EF4-FFF2-40B4-BE49-F238E27FC236}">
+                <a16:creationId xmlns:a16="http://schemas.microsoft.com/office/drawing/2014/main" id="{D6F950F9-5707-D7CB-6B79-90836DECCC80}"/>
+              </a:ext>
+            </a:extLst>
+          </p:cNvPr>
+          <p:cNvCxnSpPr>
+            <a:cxnSpLocks/>
+            <a:stCxn id="6" idx="6"/>
+            <a:endCxn id="7" idx="2"/>
+          </p:cNvCxnSpPr>
+          <p:nvPr/>
+        </p:nvCxnSpPr>
+        <p:spPr>
+          <a:xfrm>
+            <a:off x="2204330" y="3977087"/>
+            <a:ext cx="1151501" cy="10391"/>
+          </a:xfrm>
+          <a:prstGeom prst="straightConnector1">
+            <a:avLst/>
+          </a:prstGeom>
+          <a:ln>
+            <a:solidFill>
+              <a:schemeClr val="tx1"/>
+            </a:solidFill>
+            <a:headEnd type="triangle"/>
+            <a:tailEnd type="triangle"/>
+          </a:ln>
+        </p:spPr>
+        <p:style>
+          <a:lnRef idx="1">
+            <a:schemeClr val="accent1"/>
+          </a:lnRef>
+          <a:fillRef idx="0">
+            <a:schemeClr val="accent1"/>
+          </a:fillRef>
+          <a:effectRef idx="0">
+            <a:schemeClr val="accent1"/>
+          </a:effectRef>
+          <a:fontRef idx="minor">
+            <a:schemeClr val="tx1"/>
+          </a:fontRef>
+        </p:style>
+      </p:cxnSp>
+      <p:cxnSp>
+        <p:nvCxnSpPr>
+          <p:cNvPr id="73" name="Curved Connector 72">
+            <a:extLst>
+              <a:ext uri="{FF2B5EF4-FFF2-40B4-BE49-F238E27FC236}">
+                <a16:creationId xmlns:a16="http://schemas.microsoft.com/office/drawing/2014/main" id="{68B1462C-07B0-8F1F-AD8B-28DA1665513F}"/>
+              </a:ext>
+            </a:extLst>
+          </p:cNvPr>
+          <p:cNvCxnSpPr>
+            <a:cxnSpLocks/>
+            <a:stCxn id="6" idx="7"/>
+            <a:endCxn id="8" idx="1"/>
+          </p:cNvCxnSpPr>
+          <p:nvPr/>
+        </p:nvCxnSpPr>
+        <p:spPr>
+          <a:xfrm rot="16200000" flipH="1">
+            <a:off x="3765003" y="1959213"/>
+            <a:ext cx="10391" cy="3399560"/>
+          </a:xfrm>
+          <a:prstGeom prst="curvedConnector3">
+            <a:avLst>
+              <a:gd name="adj1" fmla="val -3488702"/>
+            </a:avLst>
+          </a:prstGeom>
+          <a:ln>
+            <a:solidFill>
+              <a:schemeClr val="tx1"/>
+            </a:solidFill>
+            <a:headEnd type="triangle"/>
+            <a:tailEnd type="triangle"/>
+          </a:ln>
+        </p:spPr>
+        <p:style>
+          <a:lnRef idx="1">
+            <a:schemeClr val="accent1"/>
+          </a:lnRef>
+          <a:fillRef idx="0">
+            <a:schemeClr val="accent1"/>
+          </a:fillRef>
+          <a:effectRef idx="0">
+            <a:schemeClr val="accent1"/>
+          </a:effectRef>
+          <a:fontRef idx="minor">
+            <a:schemeClr val="tx1"/>
+          </a:fontRef>
+        </p:style>
+      </p:cxnSp>
+      <p:sp>
+        <p:nvSpPr>
+          <p:cNvPr id="82" name="TextBox 81">
+            <a:extLst>
+              <a:ext uri="{FF2B5EF4-FFF2-40B4-BE49-F238E27FC236}">
+                <a16:creationId xmlns:a16="http://schemas.microsoft.com/office/drawing/2014/main" id="{2782F285-5EA9-612F-AD8C-12B3597C070E}"/>
+              </a:ext>
+            </a:extLst>
+          </p:cNvPr>
+          <p:cNvSpPr txBox="1"/>
+          <p:nvPr/>
+        </p:nvSpPr>
+        <p:spPr>
+          <a:xfrm>
+            <a:off x="2814489" y="5854422"/>
+            <a:ext cx="647934" cy="369332"/>
+          </a:xfrm>
+          <a:prstGeom prst="rect">
+            <a:avLst/>
+          </a:prstGeom>
+          <a:noFill/>
+        </p:spPr>
+        <p:txBody>
+          <a:bodyPr wrap="none" rtlCol="0">
+            <a:spAutoFit/>
+          </a:bodyPr>
+          <a:lstStyle/>
+          <a:p>
+            <a:r>
+              <a:rPr lang="en-US" dirty="0"/>
+              <a:t>trials</a:t>
+            </a:r>
+          </a:p>
+        </p:txBody>
+      </p:sp>
+      <p:sp>
+        <p:nvSpPr>
+          <p:cNvPr id="83" name="TextBox 82">
+            <a:extLst>
+              <a:ext uri="{FF2B5EF4-FFF2-40B4-BE49-F238E27FC236}">
+                <a16:creationId xmlns:a16="http://schemas.microsoft.com/office/drawing/2014/main" id="{6405CEBE-EBCD-54F0-BA85-8C3AA61008F7}"/>
+              </a:ext>
+            </a:extLst>
+          </p:cNvPr>
+          <p:cNvSpPr txBox="1"/>
+          <p:nvPr/>
+        </p:nvSpPr>
+        <p:spPr>
+          <a:xfrm>
+            <a:off x="1592438" y="6123543"/>
+            <a:ext cx="1296637" cy="369332"/>
+          </a:xfrm>
+          <a:prstGeom prst="rect">
+            <a:avLst/>
+          </a:prstGeom>
+          <a:noFill/>
+        </p:spPr>
+        <p:txBody>
+          <a:bodyPr wrap="none" rtlCol="0">
+            <a:spAutoFit/>
+          </a:bodyPr>
+          <a:lstStyle/>
+          <a:p>
+            <a:r>
+              <a:rPr lang="en-US" dirty="0"/>
+              <a:t>participants</a:t>
+            </a:r>
+          </a:p>
+        </p:txBody>
+      </p:sp>
+      <p:sp>
+        <p:nvSpPr>
+          <p:cNvPr id="84" name="TextBox 83">
+            <a:extLst>
+              <a:ext uri="{FF2B5EF4-FFF2-40B4-BE49-F238E27FC236}">
+                <a16:creationId xmlns:a16="http://schemas.microsoft.com/office/drawing/2014/main" id="{CFBE625F-6CA2-1BCC-5A58-8E3D6A28C91D}"/>
+              </a:ext>
+            </a:extLst>
+          </p:cNvPr>
+          <p:cNvSpPr txBox="1"/>
+          <p:nvPr/>
+        </p:nvSpPr>
+        <p:spPr>
+          <a:xfrm>
+            <a:off x="1158060" y="6371541"/>
+            <a:ext cx="1157305" cy="369332"/>
+          </a:xfrm>
+          <a:prstGeom prst="rect">
+            <a:avLst/>
+          </a:prstGeom>
+          <a:noFill/>
+        </p:spPr>
+        <p:txBody>
+          <a:bodyPr wrap="none" rtlCol="0">
+            <a:spAutoFit/>
+          </a:bodyPr>
+          <a:lstStyle/>
+          <a:p>
+            <a:r>
+              <a:rPr lang="en-US" dirty="0" err="1"/>
+              <a:t>agegroups</a:t>
+            </a:r>
+            <a:endParaRPr lang="en-US" dirty="0"/>
+          </a:p>
+        </p:txBody>
+      </p:sp>
+      <mc:AlternateContent xmlns:mc="http://schemas.openxmlformats.org/markup-compatibility/2006">
+        <mc:Choice xmlns:a14="http://schemas.microsoft.com/office/drawing/2010/main" Requires="a14">
+          <p:sp>
+            <p:nvSpPr>
+              <p:cNvPr id="85" name="TextBox 84">
+                <a:extLst>
+                  <a:ext uri="{FF2B5EF4-FFF2-40B4-BE49-F238E27FC236}">
+                    <a16:creationId xmlns:a16="http://schemas.microsoft.com/office/drawing/2014/main" id="{B6650218-A87C-E3BA-2034-776B7030B891}"/>
+                  </a:ext>
+                </a:extLst>
+              </p:cNvPr>
+              <p:cNvSpPr txBox="1"/>
+              <p:nvPr/>
+            </p:nvSpPr>
+            <p:spPr>
+              <a:xfrm>
+                <a:off x="7915589" y="2392275"/>
+                <a:ext cx="2005101" cy="553998"/>
+              </a:xfrm>
+              <a:prstGeom prst="rect">
+                <a:avLst/>
+              </a:prstGeom>
+              <a:noFill/>
+            </p:spPr>
+            <p:txBody>
+              <a:bodyPr wrap="none" lIns="0" tIns="0" rIns="0" bIns="0" rtlCol="0">
+                <a:spAutoFit/>
+              </a:bodyPr>
+              <a:lstStyle/>
+              <a:p>
+                <a14:m>
+                  <m:oMathPara xmlns:m="http://schemas.openxmlformats.org/officeDocument/2006/math">
+                    <m:oMathParaPr>
+                      <m:jc m:val="centerGroup"/>
+                    </m:oMathParaPr>
+                    <m:oMath xmlns:m="http://schemas.openxmlformats.org/officeDocument/2006/math">
+                      <m:sSub>
+                        <m:sSubPr>
+                          <m:ctrlPr>
+                            <a:rPr lang="de-DE" b="0" i="1" smtClean="0">
+                              <a:latin typeface="Cambria Math" panose="02040503050406030204" pitchFamily="18" charset="0"/>
+                            </a:rPr>
+                          </m:ctrlPr>
+                        </m:sSubPr>
+                        <m:e>
+                          <m:r>
+                            <a:rPr lang="de-DE" b="0" i="1" smtClean="0">
+                              <a:latin typeface="Cambria Math" panose="02040503050406030204" pitchFamily="18" charset="0"/>
+                            </a:rPr>
+                            <m:t>𝑄</m:t>
+                          </m:r>
+                        </m:e>
+                        <m:sub>
+                          <m:r>
+                            <a:rPr lang="de-DE" b="0" i="1" smtClean="0">
+                              <a:latin typeface="Cambria Math" panose="02040503050406030204" pitchFamily="18" charset="0"/>
+                            </a:rPr>
+                            <m:t>𝑡</m:t>
+                          </m:r>
+                        </m:sub>
+                      </m:sSub>
+                      <m:r>
+                        <a:rPr lang="de-DE" b="0" i="1" smtClean="0">
+                          <a:latin typeface="Cambria Math" panose="02040503050406030204" pitchFamily="18" charset="0"/>
+                        </a:rPr>
+                        <m:t>=</m:t>
+                      </m:r>
+                      <m:sSub>
+                        <m:sSubPr>
+                          <m:ctrlPr>
+                            <a:rPr lang="de-DE" b="0" i="1" smtClean="0">
+                              <a:latin typeface="Cambria Math" panose="02040503050406030204" pitchFamily="18" charset="0"/>
+                            </a:rPr>
+                          </m:ctrlPr>
+                        </m:sSubPr>
+                        <m:e>
+                          <m:r>
+                            <a:rPr lang="de-DE" b="0" i="1" smtClean="0">
+                              <a:latin typeface="Cambria Math" panose="02040503050406030204" pitchFamily="18" charset="0"/>
+                            </a:rPr>
+                            <m:t>𝑄</m:t>
+                          </m:r>
+                        </m:e>
+                        <m:sub>
+                          <m:r>
+                            <a:rPr lang="de-DE" b="0" i="1" smtClean="0">
+                              <a:latin typeface="Cambria Math" panose="02040503050406030204" pitchFamily="18" charset="0"/>
+                            </a:rPr>
+                            <m:t>𝑡</m:t>
+                          </m:r>
+                          <m:r>
+                            <a:rPr lang="de-DE" b="0" i="1" smtClean="0">
+                              <a:latin typeface="Cambria Math" panose="02040503050406030204" pitchFamily="18" charset="0"/>
+                            </a:rPr>
+                            <m:t>−1</m:t>
+                          </m:r>
+                        </m:sub>
+                      </m:sSub>
+                      <m:r>
+                        <a:rPr lang="de-DE" b="0" i="1" smtClean="0">
+                          <a:latin typeface="Cambria Math" panose="02040503050406030204" pitchFamily="18" charset="0"/>
+                        </a:rPr>
+                        <m:t>+</m:t>
+                      </m:r>
+                      <m:r>
+                        <a:rPr lang="de-DE" b="0" i="1" smtClean="0">
+                          <a:latin typeface="Cambria Math" panose="02040503050406030204" pitchFamily="18" charset="0"/>
+                        </a:rPr>
+                        <m:t>𝑙𝑟</m:t>
+                      </m:r>
+                      <m:r>
+                        <a:rPr lang="de-DE" b="0" i="1" smtClean="0">
+                          <a:latin typeface="Cambria Math" panose="02040503050406030204" pitchFamily="18" charset="0"/>
+                        </a:rPr>
+                        <m:t>∗</m:t>
+                      </m:r>
+                      <m:r>
+                        <a:rPr lang="de-DE" b="0" i="1" smtClean="0">
+                          <a:latin typeface="Cambria Math" panose="02040503050406030204" pitchFamily="18" charset="0"/>
+                        </a:rPr>
+                        <m:t>𝑝𝑒</m:t>
+                      </m:r>
+                    </m:oMath>
+                  </m:oMathPara>
+                </a14:m>
+                <a:endParaRPr lang="en-US" b="0" dirty="0"/>
+              </a:p>
+              <a:p>
+                <a14:m>
+                  <m:oMathPara xmlns:m="http://schemas.openxmlformats.org/officeDocument/2006/math">
+                    <m:oMathParaPr>
+                      <m:jc m:val="centerGroup"/>
+                    </m:oMathParaPr>
+                    <m:oMath xmlns:m="http://schemas.openxmlformats.org/officeDocument/2006/math">
+                      <m:sSub>
+                        <m:sSubPr>
+                          <m:ctrlPr>
+                            <a:rPr lang="de-DE" i="1">
+                              <a:latin typeface="Cambria Math" panose="02040503050406030204" pitchFamily="18" charset="0"/>
+                            </a:rPr>
+                          </m:ctrlPr>
+                        </m:sSubPr>
+                        <m:e>
+                          <m:r>
+                            <a:rPr lang="de-DE" i="1">
+                              <a:latin typeface="Cambria Math" panose="02040503050406030204" pitchFamily="18" charset="0"/>
+                            </a:rPr>
+                            <m:t>𝑄</m:t>
+                          </m:r>
+                        </m:e>
+                        <m:sub>
+                          <m:r>
+                            <a:rPr lang="de-DE" i="1">
+                              <a:latin typeface="Cambria Math" panose="02040503050406030204" pitchFamily="18" charset="0"/>
+                            </a:rPr>
+                            <m:t>𝑡</m:t>
+                          </m:r>
+                        </m:sub>
+                      </m:sSub>
+                      <m:r>
+                        <a:rPr lang="de-DE" b="0" i="1" smtClean="0">
+                          <a:latin typeface="Cambria Math" panose="02040503050406030204" pitchFamily="18" charset="0"/>
+                        </a:rPr>
+                        <m:t>=</m:t>
+                      </m:r>
+                      <m:sSub>
+                        <m:sSubPr>
+                          <m:ctrlPr>
+                            <a:rPr lang="de-DE" b="0" i="1" smtClean="0">
+                              <a:latin typeface="Cambria Math" panose="02040503050406030204" pitchFamily="18" charset="0"/>
+                            </a:rPr>
+                          </m:ctrlPr>
+                        </m:sSubPr>
+                        <m:e>
+                          <m:r>
+                            <a:rPr lang="de-DE" b="0" i="1" smtClean="0">
+                              <a:latin typeface="Cambria Math" panose="02040503050406030204" pitchFamily="18" charset="0"/>
+                            </a:rPr>
+                            <m:t>𝑄</m:t>
+                          </m:r>
+                        </m:e>
+                        <m:sub>
+                          <m:r>
+                            <a:rPr lang="de-DE" b="0" i="1" smtClean="0">
+                              <a:latin typeface="Cambria Math" panose="02040503050406030204" pitchFamily="18" charset="0"/>
+                            </a:rPr>
+                            <m:t>𝑡</m:t>
+                          </m:r>
+                        </m:sub>
+                      </m:sSub>
+                      <m:r>
+                        <a:rPr lang="de-DE" b="0" i="1" smtClean="0">
+                          <a:latin typeface="Cambria Math" panose="02040503050406030204" pitchFamily="18" charset="0"/>
+                        </a:rPr>
+                        <m:t>+</m:t>
+                      </m:r>
+                      <m:r>
+                        <a:rPr lang="de-DE" b="0" i="1" smtClean="0">
+                          <a:latin typeface="Cambria Math" panose="02040503050406030204" pitchFamily="18" charset="0"/>
+                        </a:rPr>
+                        <m:t>𝑠𝑤</m:t>
+                      </m:r>
+                    </m:oMath>
+                  </m:oMathPara>
+                </a14:m>
+                <a:endParaRPr lang="de-DE" b="0" dirty="0"/>
+              </a:p>
+            </p:txBody>
+          </p:sp>
+        </mc:Choice>
+        <mc:Fallback>
+          <p:sp>
+            <p:nvSpPr>
+              <p:cNvPr id="85" name="TextBox 84">
+                <a:extLst>
+                  <a:ext uri="{FF2B5EF4-FFF2-40B4-BE49-F238E27FC236}">
+                    <a16:creationId xmlns:a16="http://schemas.microsoft.com/office/drawing/2014/main" id="{B6650218-A87C-E3BA-2034-776B7030B891}"/>
+                  </a:ext>
+                </a:extLst>
+              </p:cNvPr>
+              <p:cNvSpPr txBox="1">
+                <a:spLocks noRot="1" noChangeAspect="1" noMove="1" noResize="1" noEditPoints="1" noAdjustHandles="1" noChangeArrowheads="1" noChangeShapeType="1" noTextEdit="1"/>
+              </p:cNvSpPr>
+              <p:nvPr/>
+            </p:nvSpPr>
+            <p:spPr>
+              <a:xfrm>
+                <a:off x="7915589" y="2392275"/>
+                <a:ext cx="2005101" cy="553998"/>
+              </a:xfrm>
+              <a:prstGeom prst="rect">
+                <a:avLst/>
+              </a:prstGeom>
+              <a:blipFill>
+                <a:blip r:embed="rId2"/>
+                <a:stretch>
+                  <a:fillRect l="-2532" r="-1899" b="-15909"/>
+                </a:stretch>
+              </a:blipFill>
+            </p:spPr>
+            <p:txBody>
+              <a:bodyPr/>
+              <a:lstStyle/>
+              <a:p>
+                <a:r>
+                  <a:rPr lang="en-US">
+                    <a:noFill/>
+                  </a:rPr>
+                  <a:t> </a:t>
+                </a:r>
+              </a:p>
+            </p:txBody>
+          </p:sp>
+        </mc:Fallback>
+      </mc:AlternateContent>
+    </p:spTree>
+    <p:extLst>
+      <p:ext uri="{BB962C8B-B14F-4D97-AF65-F5344CB8AC3E}">
+        <p14:creationId xmlns:p14="http://schemas.microsoft.com/office/powerpoint/2010/main" val="4285625063"/>
+      </p:ext>
+    </p:extLst>
+  </p:cSld>
+  <p:clrMapOvr>
+    <a:masterClrMapping/>
+  </p:clrMapOvr>
+</p:sld>
+</file>
+
 <file path=ppt/theme/theme1.xml><?xml version="1.0" encoding="utf-8"?>
 <a:theme xmlns:a="http://schemas.openxmlformats.org/drawingml/2006/main" name="Office Theme">
   <a:themeElements>

</xml_diff>